<commit_message>
fix major bug: Louvain may crash sometime... so we add timeout function in  Abnormal_Scenario_generation.py to control timeout 10 times for louvain... After reboot Louvain for 10 times, we directly set community result to all the nodes belong to one community
</commit_message>
<xml_diff>
--- a/tianchi_dataset_description.pptx
+++ b/tianchi_dataset_description.pptx
@@ -5,10 +5,10 @@
     <p:sldMasterId id="2147483672" r:id="rId1"/>
   </p:sldMasterIdLst>
   <p:notesMasterIdLst>
-    <p:notesMasterId r:id="rId15"/>
+    <p:notesMasterId r:id="rId16"/>
   </p:notesMasterIdLst>
   <p:handoutMasterIdLst>
-    <p:handoutMasterId r:id="rId16"/>
+    <p:handoutMasterId r:id="rId17"/>
   </p:handoutMasterIdLst>
   <p:sldIdLst>
     <p:sldId id="256" r:id="rId2"/>
@@ -19,11 +19,12 @@
     <p:sldId id="260" r:id="rId7"/>
     <p:sldId id="261" r:id="rId8"/>
     <p:sldId id="267" r:id="rId9"/>
-    <p:sldId id="268" r:id="rId10"/>
-    <p:sldId id="271" r:id="rId11"/>
-    <p:sldId id="269" r:id="rId12"/>
-    <p:sldId id="272" r:id="rId13"/>
-    <p:sldId id="270" r:id="rId14"/>
+    <p:sldId id="274" r:id="rId10"/>
+    <p:sldId id="268" r:id="rId11"/>
+    <p:sldId id="271" r:id="rId12"/>
+    <p:sldId id="269" r:id="rId13"/>
+    <p:sldId id="272" r:id="rId14"/>
+    <p:sldId id="270" r:id="rId15"/>
   </p:sldIdLst>
   <p:sldSz cx="12192000" cy="6858000"/>
   <p:notesSz cx="6858000" cy="9144000"/>
@@ -212,7 +213,7 @@
           <a:p>
             <a:fld id="{63AEFC68-88E8-3F42-899B-A52E68DCFD4C}" type="datetimeFigureOut">
               <a:rPr lang="en-US" smtClean="0"/>
-              <a:t>10/16/17</a:t>
+              <a:t>10/17/17</a:t>
             </a:fld>
             <a:endParaRPr lang="en-US"/>
           </a:p>
@@ -377,7 +378,7 @@
           <a:p>
             <a:fld id="{B87DE4D6-73E4-F747-BCB5-78CBBA229CBA}" type="datetimeFigureOut">
               <a:rPr lang="en-US" smtClean="0"/>
-              <a:t>10/16/17</a:t>
+              <a:t>10/17/17</a:t>
             </a:fld>
             <a:endParaRPr lang="en-US"/>
           </a:p>
@@ -776,7 +777,7 @@
           <a:p>
             <a:fld id="{BB2384C5-EEE8-9B42-90FE-8FCC147FFB37}" type="datetimeFigureOut">
               <a:rPr lang="en-US" smtClean="0"/>
-              <a:t>10/16/17</a:t>
+              <a:t>10/17/17</a:t>
             </a:fld>
             <a:endParaRPr lang="en-US"/>
           </a:p>
@@ -941,7 +942,7 @@
           <a:p>
             <a:fld id="{BB2384C5-EEE8-9B42-90FE-8FCC147FFB37}" type="datetimeFigureOut">
               <a:rPr lang="en-US" smtClean="0"/>
-              <a:t>10/16/17</a:t>
+              <a:t>10/17/17</a:t>
             </a:fld>
             <a:endParaRPr lang="en-US"/>
           </a:p>
@@ -1116,7 +1117,7 @@
           <a:p>
             <a:fld id="{BB2384C5-EEE8-9B42-90FE-8FCC147FFB37}" type="datetimeFigureOut">
               <a:rPr lang="en-US" smtClean="0"/>
-              <a:t>10/16/17</a:t>
+              <a:t>10/17/17</a:t>
             </a:fld>
             <a:endParaRPr lang="en-US"/>
           </a:p>
@@ -1281,7 +1282,7 @@
           <a:p>
             <a:fld id="{BB2384C5-EEE8-9B42-90FE-8FCC147FFB37}" type="datetimeFigureOut">
               <a:rPr lang="en-US" smtClean="0"/>
-              <a:t>10/16/17</a:t>
+              <a:t>10/17/17</a:t>
             </a:fld>
             <a:endParaRPr lang="en-US"/>
           </a:p>
@@ -1522,7 +1523,7 @@
           <a:p>
             <a:fld id="{BB2384C5-EEE8-9B42-90FE-8FCC147FFB37}" type="datetimeFigureOut">
               <a:rPr lang="en-US" smtClean="0"/>
-              <a:t>10/16/17</a:t>
+              <a:t>10/17/17</a:t>
             </a:fld>
             <a:endParaRPr lang="en-US"/>
           </a:p>
@@ -1749,7 +1750,7 @@
           <a:p>
             <a:fld id="{BB2384C5-EEE8-9B42-90FE-8FCC147FFB37}" type="datetimeFigureOut">
               <a:rPr lang="en-US" smtClean="0"/>
-              <a:t>10/16/17</a:t>
+              <a:t>10/17/17</a:t>
             </a:fld>
             <a:endParaRPr lang="en-US"/>
           </a:p>
@@ -2111,7 +2112,7 @@
           <a:p>
             <a:fld id="{BB2384C5-EEE8-9B42-90FE-8FCC147FFB37}" type="datetimeFigureOut">
               <a:rPr lang="en-US" smtClean="0"/>
-              <a:t>10/16/17</a:t>
+              <a:t>10/17/17</a:t>
             </a:fld>
             <a:endParaRPr lang="en-US"/>
           </a:p>
@@ -2224,7 +2225,7 @@
           <a:p>
             <a:fld id="{BB2384C5-EEE8-9B42-90FE-8FCC147FFB37}" type="datetimeFigureOut">
               <a:rPr lang="en-US" smtClean="0"/>
-              <a:t>10/16/17</a:t>
+              <a:t>10/17/17</a:t>
             </a:fld>
             <a:endParaRPr lang="en-US"/>
           </a:p>
@@ -2314,7 +2315,7 @@
           <a:p>
             <a:fld id="{BB2384C5-EEE8-9B42-90FE-8FCC147FFB37}" type="datetimeFigureOut">
               <a:rPr lang="en-US" smtClean="0"/>
-              <a:t>10/16/17</a:t>
+              <a:t>10/17/17</a:t>
             </a:fld>
             <a:endParaRPr lang="en-US"/>
           </a:p>
@@ -2586,7 +2587,7 @@
           <a:p>
             <a:fld id="{BB2384C5-EEE8-9B42-90FE-8FCC147FFB37}" type="datetimeFigureOut">
               <a:rPr lang="en-US" smtClean="0"/>
-              <a:t>10/16/17</a:t>
+              <a:t>10/17/17</a:t>
             </a:fld>
             <a:endParaRPr lang="en-US"/>
           </a:p>
@@ -2838,7 +2839,7 @@
           <a:p>
             <a:fld id="{BB2384C5-EEE8-9B42-90FE-8FCC147FFB37}" type="datetimeFigureOut">
               <a:rPr lang="en-US" smtClean="0"/>
-              <a:t>10/16/17</a:t>
+              <a:t>10/17/17</a:t>
             </a:fld>
             <a:endParaRPr lang="en-US"/>
           </a:p>
@@ -3046,7 +3047,7 @@
           <a:p>
             <a:fld id="{BB2384C5-EEE8-9B42-90FE-8FCC147FFB37}" type="datetimeFigureOut">
               <a:rPr lang="en-US" smtClean="0"/>
-              <a:t>10/16/17</a:t>
+              <a:t>10/17/17</a:t>
             </a:fld>
             <a:endParaRPr lang="en-US"/>
           </a:p>
@@ -3475,7 +3476,15 @@
           <a:p>
             <a:r>
               <a:rPr lang="en-US" sz="4400" dirty="0"/>
-              <a:t>Privacy-Preserving Recommendation of Abnormal User Behavior using Multilayer Network Analysis</a:t>
+              <a:t>Privacy-Preserving Recommendation of </a:t>
+            </a:r>
+            <a:r>
+              <a:rPr lang="en-US" sz="4400" dirty="0"/>
+              <a:t>User Abnormal Behavior </a:t>
+            </a:r>
+            <a:r>
+              <a:rPr lang="en-US" sz="4400" dirty="0"/>
+              <a:t>using Multilayer Network Analysis</a:t>
             </a:r>
           </a:p>
         </p:txBody>
@@ -3534,6 +3543,576 @@
 </file>
 
 <file path=ppt/slides/slide10.xml><?xml version="1.0" encoding="utf-8"?>
+<p:sld xmlns:a="http://schemas.openxmlformats.org/drawingml/2006/main" xmlns:r="http://schemas.openxmlformats.org/officeDocument/2006/relationships" xmlns:p="http://schemas.openxmlformats.org/presentationml/2006/main">
+  <p:cSld>
+    <p:spTree>
+      <p:nvGrpSpPr>
+        <p:cNvPr id="1" name=""/>
+        <p:cNvGrpSpPr/>
+        <p:nvPr/>
+      </p:nvGrpSpPr>
+      <p:grpSpPr>
+        <a:xfrm>
+          <a:off x="0" y="0"/>
+          <a:ext cx="0" cy="0"/>
+          <a:chOff x="0" y="0"/>
+          <a:chExt cx="0" cy="0"/>
+        </a:xfrm>
+      </p:grpSpPr>
+      <p:sp>
+        <p:nvSpPr>
+          <p:cNvPr id="2" name="Title 1"/>
+          <p:cNvSpPr>
+            <a:spLocks noGrp="1"/>
+          </p:cNvSpPr>
+          <p:nvPr>
+            <p:ph type="title"/>
+          </p:nvPr>
+        </p:nvSpPr>
+        <p:spPr/>
+        <p:txBody>
+          <a:bodyPr/>
+          <a:lstStyle/>
+          <a:p>
+            <a:r>
+              <a:rPr lang="en-US" dirty="0" smtClean="0"/>
+              <a:t>Scenario 1: Log-in System For </a:t>
+            </a:r>
+            <a:r>
+              <a:rPr lang="en-US" b="1" dirty="0" smtClean="0"/>
+              <a:t>ALL USER</a:t>
+            </a:r>
+            <a:endParaRPr lang="en-US" b="1" dirty="0"/>
+          </a:p>
+        </p:txBody>
+      </p:sp>
+      <p:sp>
+        <p:nvSpPr>
+          <p:cNvPr id="4" name="Rectangle 3"/>
+          <p:cNvSpPr/>
+          <p:nvPr/>
+        </p:nvSpPr>
+        <p:spPr>
+          <a:xfrm>
+            <a:off x="1010093" y="2402958"/>
+            <a:ext cx="6698512" cy="4029740"/>
+          </a:xfrm>
+          <a:prstGeom prst="rect">
+            <a:avLst/>
+          </a:prstGeom>
+        </p:spPr>
+        <p:style>
+          <a:lnRef idx="2">
+            <a:schemeClr val="accent2"/>
+          </a:lnRef>
+          <a:fillRef idx="1">
+            <a:schemeClr val="lt1"/>
+          </a:fillRef>
+          <a:effectRef idx="0">
+            <a:schemeClr val="accent2"/>
+          </a:effectRef>
+          <a:fontRef idx="minor">
+            <a:schemeClr val="dk1"/>
+          </a:fontRef>
+        </p:style>
+        <p:txBody>
+          <a:bodyPr rtlCol="0" anchor="ctr"/>
+          <a:lstStyle/>
+          <a:p>
+            <a:pPr algn="ctr"/>
+            <a:endParaRPr lang="en-US"/>
+          </a:p>
+        </p:txBody>
+      </p:sp>
+      <p:sp>
+        <p:nvSpPr>
+          <p:cNvPr id="5" name="Rectangle 4"/>
+          <p:cNvSpPr/>
+          <p:nvPr/>
+        </p:nvSpPr>
+        <p:spPr>
+          <a:xfrm>
+            <a:off x="1010093" y="1690688"/>
+            <a:ext cx="6677247" cy="563414"/>
+          </a:xfrm>
+          <a:prstGeom prst="rect">
+            <a:avLst/>
+          </a:prstGeom>
+        </p:spPr>
+        <p:style>
+          <a:lnRef idx="2">
+            <a:schemeClr val="dk1"/>
+          </a:lnRef>
+          <a:fillRef idx="1">
+            <a:schemeClr val="lt1"/>
+          </a:fillRef>
+          <a:effectRef idx="0">
+            <a:schemeClr val="dk1"/>
+          </a:effectRef>
+          <a:fontRef idx="minor">
+            <a:schemeClr val="dk1"/>
+          </a:fontRef>
+        </p:style>
+        <p:txBody>
+          <a:bodyPr rtlCol="0" anchor="ctr"/>
+          <a:lstStyle/>
+          <a:p>
+            <a:r>
+              <a:rPr lang="en-US" dirty="0" smtClean="0"/>
+              <a:t>Please Input User ID:</a:t>
+            </a:r>
+            <a:endParaRPr lang="en-US" dirty="0"/>
+          </a:p>
+        </p:txBody>
+      </p:sp>
+      <p:sp>
+        <p:nvSpPr>
+          <p:cNvPr id="7" name="Rectangle 6"/>
+          <p:cNvSpPr/>
+          <p:nvPr/>
+        </p:nvSpPr>
+        <p:spPr>
+          <a:xfrm>
+            <a:off x="7081284" y="1690688"/>
+            <a:ext cx="606056" cy="563414"/>
+          </a:xfrm>
+          <a:prstGeom prst="rect">
+            <a:avLst/>
+          </a:prstGeom>
+        </p:spPr>
+        <p:style>
+          <a:lnRef idx="2">
+            <a:schemeClr val="dk1">
+              <a:shade val="50000"/>
+            </a:schemeClr>
+          </a:lnRef>
+          <a:fillRef idx="1">
+            <a:schemeClr val="dk1"/>
+          </a:fillRef>
+          <a:effectRef idx="0">
+            <a:schemeClr val="dk1"/>
+          </a:effectRef>
+          <a:fontRef idx="minor">
+            <a:schemeClr val="lt1"/>
+          </a:fontRef>
+        </p:style>
+        <p:txBody>
+          <a:bodyPr rtlCol="0" anchor="ctr"/>
+          <a:lstStyle/>
+          <a:p>
+            <a:pPr algn="ctr"/>
+            <a:endParaRPr lang="en-US"/>
+          </a:p>
+        </p:txBody>
+      </p:sp>
+      <p:sp>
+        <p:nvSpPr>
+          <p:cNvPr id="8" name="Triangle 7"/>
+          <p:cNvSpPr/>
+          <p:nvPr/>
+        </p:nvSpPr>
+        <p:spPr>
+          <a:xfrm rot="10800000">
+            <a:off x="7133596" y="1756261"/>
+            <a:ext cx="501432" cy="432269"/>
+          </a:xfrm>
+          <a:prstGeom prst="triangle">
+            <a:avLst/>
+          </a:prstGeom>
+        </p:spPr>
+        <p:style>
+          <a:lnRef idx="2">
+            <a:schemeClr val="dk1"/>
+          </a:lnRef>
+          <a:fillRef idx="1">
+            <a:schemeClr val="lt1"/>
+          </a:fillRef>
+          <a:effectRef idx="0">
+            <a:schemeClr val="dk1"/>
+          </a:effectRef>
+          <a:fontRef idx="minor">
+            <a:schemeClr val="dk1"/>
+          </a:fontRef>
+        </p:style>
+        <p:txBody>
+          <a:bodyPr rtlCol="0" anchor="ctr"/>
+          <a:lstStyle/>
+          <a:p>
+            <a:pPr algn="ctr"/>
+            <a:endParaRPr lang="en-US"/>
+          </a:p>
+        </p:txBody>
+      </p:sp>
+      <p:pic>
+        <p:nvPicPr>
+          <p:cNvPr id="9" name="Picture 8"/>
+          <p:cNvPicPr>
+            <a:picLocks noChangeAspect="1"/>
+          </p:cNvPicPr>
+          <p:nvPr/>
+        </p:nvPicPr>
+        <p:blipFill>
+          <a:blip r:embed="rId2"/>
+          <a:stretch>
+            <a:fillRect/>
+          </a:stretch>
+        </p:blipFill>
+        <p:spPr>
+          <a:xfrm>
+            <a:off x="2714290" y="2727251"/>
+            <a:ext cx="3717498" cy="3381153"/>
+          </a:xfrm>
+          <a:prstGeom prst="rect">
+            <a:avLst/>
+          </a:prstGeom>
+        </p:spPr>
+      </p:pic>
+      <p:sp>
+        <p:nvSpPr>
+          <p:cNvPr id="14" name="TextBox 13"/>
+          <p:cNvSpPr txBox="1"/>
+          <p:nvPr/>
+        </p:nvSpPr>
+        <p:spPr>
+          <a:xfrm>
+            <a:off x="8134062" y="1510730"/>
+            <a:ext cx="3272050" cy="923330"/>
+          </a:xfrm>
+          <a:prstGeom prst="rect">
+            <a:avLst/>
+          </a:prstGeom>
+          <a:noFill/>
+        </p:spPr>
+        <p:txBody>
+          <a:bodyPr wrap="none" rtlCol="0">
+            <a:spAutoFit/>
+          </a:bodyPr>
+          <a:lstStyle/>
+          <a:p>
+            <a:r>
+              <a:rPr lang="zh-CN" altLang="en-US" b="1" dirty="0" smtClean="0">
+                <a:solidFill>
+                  <a:srgbClr val="7030A0"/>
+                </a:solidFill>
+              </a:rPr>
+              <a:t>输入</a:t>
+            </a:r>
+            <a:r>
+              <a:rPr lang="en-US" altLang="zh-CN" b="1" dirty="0" smtClean="0">
+                <a:solidFill>
+                  <a:srgbClr val="7030A0"/>
+                </a:solidFill>
+              </a:rPr>
+              <a:t>ID</a:t>
+            </a:r>
+            <a:r>
+              <a:rPr lang="zh-CN" altLang="en-US" b="1" dirty="0" smtClean="0">
+                <a:solidFill>
+                  <a:srgbClr val="7030A0"/>
+                </a:solidFill>
+              </a:rPr>
+              <a:t>方框</a:t>
+            </a:r>
+            <a:endParaRPr lang="en-US" altLang="zh-CN" b="1" dirty="0" smtClean="0">
+              <a:solidFill>
+                <a:srgbClr val="7030A0"/>
+              </a:solidFill>
+            </a:endParaRPr>
+          </a:p>
+          <a:p>
+            <a:pPr marL="342900" indent="-342900">
+              <a:buAutoNum type="arabicPeriod"/>
+            </a:pPr>
+            <a:r>
+              <a:rPr lang="zh-CN" altLang="en-US" b="1" dirty="0" smtClean="0">
+                <a:solidFill>
+                  <a:srgbClr val="7030A0"/>
+                </a:solidFill>
+              </a:rPr>
+              <a:t>可以直接输入</a:t>
+            </a:r>
+            <a:r>
+              <a:rPr lang="en-US" altLang="zh-CN" b="1" dirty="0" smtClean="0">
+                <a:solidFill>
+                  <a:srgbClr val="7030A0"/>
+                </a:solidFill>
+              </a:rPr>
+              <a:t>User</a:t>
+            </a:r>
+            <a:r>
+              <a:rPr lang="zh-CN" altLang="en-US" b="1" dirty="0" smtClean="0">
+                <a:solidFill>
+                  <a:srgbClr val="7030A0"/>
+                </a:solidFill>
+              </a:rPr>
+              <a:t>  </a:t>
+            </a:r>
+            <a:r>
+              <a:rPr lang="en-US" altLang="zh-CN" b="1" dirty="0" smtClean="0">
+                <a:solidFill>
+                  <a:srgbClr val="7030A0"/>
+                </a:solidFill>
+              </a:rPr>
+              <a:t>ID</a:t>
+            </a:r>
+            <a:r>
+              <a:rPr lang="zh-CN" altLang="en-US" b="1" dirty="0" smtClean="0">
+                <a:solidFill>
+                  <a:srgbClr val="7030A0"/>
+                </a:solidFill>
+              </a:rPr>
+              <a:t> </a:t>
+            </a:r>
+            <a:endParaRPr lang="en-US" altLang="zh-CN" b="1" dirty="0" smtClean="0">
+              <a:solidFill>
+                <a:srgbClr val="7030A0"/>
+              </a:solidFill>
+            </a:endParaRPr>
+          </a:p>
+          <a:p>
+            <a:pPr marL="342900" indent="-342900">
+              <a:buAutoNum type="arabicPeriod"/>
+            </a:pPr>
+            <a:r>
+              <a:rPr lang="zh-CN" altLang="en-US" b="1" dirty="0" smtClean="0">
+                <a:solidFill>
+                  <a:srgbClr val="7030A0"/>
+                </a:solidFill>
+              </a:rPr>
+              <a:t>可以通过下拉菜单选择</a:t>
+            </a:r>
+            <a:r>
+              <a:rPr lang="en-US" altLang="zh-CN" b="1" dirty="0" smtClean="0">
+                <a:solidFill>
+                  <a:srgbClr val="7030A0"/>
+                </a:solidFill>
+              </a:rPr>
+              <a:t>User</a:t>
+            </a:r>
+            <a:endParaRPr lang="en-US" b="1" dirty="0">
+              <a:solidFill>
+                <a:srgbClr val="7030A0"/>
+              </a:solidFill>
+            </a:endParaRPr>
+          </a:p>
+        </p:txBody>
+      </p:sp>
+      <p:sp>
+        <p:nvSpPr>
+          <p:cNvPr id="15" name="TextBox 14"/>
+          <p:cNvSpPr txBox="1"/>
+          <p:nvPr/>
+        </p:nvSpPr>
+        <p:spPr>
+          <a:xfrm>
+            <a:off x="8133907" y="2600880"/>
+            <a:ext cx="3838353" cy="3831818"/>
+          </a:xfrm>
+          <a:prstGeom prst="rect">
+            <a:avLst/>
+          </a:prstGeom>
+          <a:noFill/>
+        </p:spPr>
+        <p:txBody>
+          <a:bodyPr wrap="square" rtlCol="0">
+            <a:spAutoFit/>
+          </a:bodyPr>
+          <a:lstStyle/>
+          <a:p>
+            <a:pPr>
+              <a:lnSpc>
+                <a:spcPct val="150000"/>
+              </a:lnSpc>
+            </a:pPr>
+            <a:r>
+              <a:rPr lang="zh-CN" altLang="en-US" b="1" dirty="0" smtClean="0">
+                <a:solidFill>
+                  <a:srgbClr val="7030A0"/>
+                </a:solidFill>
+              </a:rPr>
+              <a:t>所有节点的</a:t>
+            </a:r>
+            <a:r>
+              <a:rPr lang="en-US" altLang="zh-CN" b="1" dirty="0" smtClean="0">
+                <a:solidFill>
+                  <a:srgbClr val="7030A0"/>
+                </a:solidFill>
+              </a:rPr>
+              <a:t>Network</a:t>
+            </a:r>
+            <a:r>
+              <a:rPr lang="zh-CN" altLang="en-US" b="1" dirty="0" smtClean="0">
+                <a:solidFill>
+                  <a:srgbClr val="7030A0"/>
+                </a:solidFill>
+              </a:rPr>
+              <a:t>网络图</a:t>
+            </a:r>
+            <a:endParaRPr lang="en-US" altLang="zh-CN" b="1" dirty="0" smtClean="0">
+              <a:solidFill>
+                <a:srgbClr val="7030A0"/>
+              </a:solidFill>
+            </a:endParaRPr>
+          </a:p>
+          <a:p>
+            <a:pPr marL="342900" indent="-342900">
+              <a:lnSpc>
+                <a:spcPct val="150000"/>
+              </a:lnSpc>
+              <a:buAutoNum type="arabicPeriod"/>
+            </a:pPr>
+            <a:r>
+              <a:rPr lang="zh-CN" altLang="en-US" b="1" dirty="0" smtClean="0">
+                <a:solidFill>
+                  <a:srgbClr val="7030A0"/>
+                </a:solidFill>
+              </a:rPr>
+              <a:t>每一种颜色代表一个</a:t>
+            </a:r>
+            <a:r>
+              <a:rPr lang="en-US" altLang="zh-CN" b="1" dirty="0" smtClean="0">
+                <a:solidFill>
+                  <a:srgbClr val="7030A0"/>
+                </a:solidFill>
+              </a:rPr>
+              <a:t>User</a:t>
+            </a:r>
+          </a:p>
+          <a:p>
+            <a:pPr marL="342900" indent="-342900">
+              <a:lnSpc>
+                <a:spcPct val="150000"/>
+              </a:lnSpc>
+              <a:buAutoNum type="arabicPeriod"/>
+            </a:pPr>
+            <a:r>
+              <a:rPr lang="zh-CN" altLang="en-US" b="1" dirty="0" smtClean="0">
+                <a:solidFill>
+                  <a:srgbClr val="7030A0"/>
+                </a:solidFill>
+              </a:rPr>
+              <a:t>这个图应该是随机布局的。目的是为了展示“混乱”程度。</a:t>
+            </a:r>
+            <a:endParaRPr lang="en-US" altLang="zh-CN" b="1" dirty="0" smtClean="0">
+              <a:solidFill>
+                <a:srgbClr val="7030A0"/>
+              </a:solidFill>
+            </a:endParaRPr>
+          </a:p>
+          <a:p>
+            <a:pPr marL="342900" indent="-342900">
+              <a:lnSpc>
+                <a:spcPct val="150000"/>
+              </a:lnSpc>
+              <a:buAutoNum type="arabicPeriod"/>
+            </a:pPr>
+            <a:r>
+              <a:rPr lang="zh-CN" altLang="en-US" b="1" dirty="0" smtClean="0">
+                <a:solidFill>
+                  <a:srgbClr val="7030A0"/>
+                </a:solidFill>
+              </a:rPr>
+              <a:t>图上的点是可以点击的。点击效果和上面输入</a:t>
+            </a:r>
+            <a:r>
+              <a:rPr lang="en-US" altLang="zh-CN" b="1" dirty="0" smtClean="0">
+                <a:solidFill>
+                  <a:srgbClr val="7030A0"/>
+                </a:solidFill>
+              </a:rPr>
+              <a:t>Id</a:t>
+            </a:r>
+            <a:r>
+              <a:rPr lang="zh-CN" altLang="en-US" b="1" dirty="0" smtClean="0">
+                <a:solidFill>
+                  <a:srgbClr val="7030A0"/>
+                </a:solidFill>
+              </a:rPr>
+              <a:t>方框的效果是一样的。</a:t>
+            </a:r>
+            <a:endParaRPr lang="en-US" altLang="zh-CN" b="1" dirty="0" smtClean="0">
+              <a:solidFill>
+                <a:srgbClr val="7030A0"/>
+              </a:solidFill>
+            </a:endParaRPr>
+          </a:p>
+          <a:p>
+            <a:pPr marL="342900" indent="-342900">
+              <a:lnSpc>
+                <a:spcPct val="150000"/>
+              </a:lnSpc>
+              <a:buAutoNum type="arabicPeriod"/>
+            </a:pPr>
+            <a:r>
+              <a:rPr lang="en-US" altLang="zh-CN" b="1" dirty="0" smtClean="0">
+                <a:solidFill>
+                  <a:srgbClr val="7030A0"/>
+                </a:solidFill>
+              </a:rPr>
+              <a:t>p.s.</a:t>
+            </a:r>
+            <a:r>
+              <a:rPr lang="zh-CN" altLang="en-US" b="1" dirty="0" smtClean="0">
+                <a:solidFill>
+                  <a:srgbClr val="7030A0"/>
+                </a:solidFill>
+              </a:rPr>
+              <a:t>如果节点太多，就随机展示</a:t>
+            </a:r>
+            <a:r>
+              <a:rPr lang="en-US" altLang="zh-CN" b="1" dirty="0" smtClean="0">
+                <a:solidFill>
+                  <a:srgbClr val="7030A0"/>
+                </a:solidFill>
+              </a:rPr>
+              <a:t>100</a:t>
+            </a:r>
+            <a:r>
+              <a:rPr lang="zh-CN" altLang="en-US" b="1" dirty="0" smtClean="0">
+                <a:solidFill>
+                  <a:srgbClr val="7030A0"/>
+                </a:solidFill>
+              </a:rPr>
+              <a:t>个左右就</a:t>
+            </a:r>
+            <a:r>
+              <a:rPr lang="en-US" altLang="zh-CN" b="1" dirty="0" smtClean="0">
+                <a:solidFill>
+                  <a:srgbClr val="7030A0"/>
+                </a:solidFill>
+              </a:rPr>
+              <a:t>OK</a:t>
+            </a:r>
+            <a:r>
+              <a:rPr lang="zh-CN" altLang="en-US" b="1" dirty="0" smtClean="0">
+                <a:solidFill>
+                  <a:srgbClr val="7030A0"/>
+                </a:solidFill>
+              </a:rPr>
+              <a:t>了</a:t>
+            </a:r>
+            <a:endParaRPr lang="en-US" b="1" dirty="0">
+              <a:solidFill>
+                <a:srgbClr val="7030A0"/>
+              </a:solidFill>
+            </a:endParaRPr>
+          </a:p>
+        </p:txBody>
+      </p:sp>
+    </p:spTree>
+    <p:extLst>
+      <p:ext uri="{BB962C8B-B14F-4D97-AF65-F5344CB8AC3E}">
+        <p14:creationId xmlns:p14="http://schemas.microsoft.com/office/powerpoint/2010/main" val="1303274987"/>
+      </p:ext>
+    </p:extLst>
+  </p:cSld>
+  <p:clrMapOvr>
+    <a:masterClrMapping/>
+  </p:clrMapOvr>
+</p:sld>
+</file>
+
+<file path=ppt/slides/slide11.xml><?xml version="1.0" encoding="utf-8"?>
 <p:sld xmlns:a="http://schemas.openxmlformats.org/drawingml/2006/main" xmlns:r="http://schemas.openxmlformats.org/officeDocument/2006/relationships" xmlns:p="http://schemas.openxmlformats.org/presentationml/2006/main">
   <p:cSld>
     <p:spTree>
@@ -4354,7 +4933,7 @@
 </p:sld>
 </file>
 
-<file path=ppt/slides/slide11.xml><?xml version="1.0" encoding="utf-8"?>
+<file path=ppt/slides/slide12.xml><?xml version="1.0" encoding="utf-8"?>
 <p:sld xmlns:a="http://schemas.openxmlformats.org/drawingml/2006/main" xmlns:r="http://schemas.openxmlformats.org/officeDocument/2006/relationships" xmlns:p="http://schemas.openxmlformats.org/presentationml/2006/main">
   <p:cSld>
     <p:spTree>
@@ -5867,7 +6446,7 @@
 </p:sld>
 </file>
 
-<file path=ppt/slides/slide12.xml><?xml version="1.0" encoding="utf-8"?>
+<file path=ppt/slides/slide13.xml><?xml version="1.0" encoding="utf-8"?>
 <p:sld xmlns:a="http://schemas.openxmlformats.org/drawingml/2006/main" xmlns:r="http://schemas.openxmlformats.org/officeDocument/2006/relationships" xmlns:p="http://schemas.openxmlformats.org/presentationml/2006/main">
   <p:cSld>
     <p:spTree>
@@ -7461,7 +8040,7 @@
 </p:sld>
 </file>
 
-<file path=ppt/slides/slide13.xml><?xml version="1.0" encoding="utf-8"?>
+<file path=ppt/slides/slide14.xml><?xml version="1.0" encoding="utf-8"?>
 <p:sld xmlns:a="http://schemas.openxmlformats.org/drawingml/2006/main" xmlns:r="http://schemas.openxmlformats.org/officeDocument/2006/relationships" xmlns:p="http://schemas.openxmlformats.org/presentationml/2006/main">
   <p:cSld>
     <p:spTree>
@@ -16982,534 +17561,1103 @@
           <a:lstStyle/>
           <a:p>
             <a:r>
+              <a:rPr lang="en-US" dirty="0" err="1" smtClean="0"/>
+              <a:t>Viz</a:t>
+            </a:r>
+            <a:r>
               <a:rPr lang="en-US" dirty="0" smtClean="0"/>
-              <a:t>Scenario 1: Log-in System For </a:t>
-            </a:r>
-            <a:r>
-              <a:rPr lang="en-US" b="1" dirty="0" smtClean="0"/>
-              <a:t>ALL USER</a:t>
-            </a:r>
-            <a:endParaRPr lang="en-US" b="1" dirty="0"/>
+              <a:t> Architecture</a:t>
+            </a:r>
+            <a:endParaRPr lang="en-US" dirty="0"/>
           </a:p>
         </p:txBody>
       </p:sp>
-      <p:sp>
-        <p:nvSpPr>
-          <p:cNvPr id="4" name="Rectangle 3"/>
-          <p:cNvSpPr/>
+      <p:grpSp>
+        <p:nvGrpSpPr>
+          <p:cNvPr id="64" name="Group 63"/>
+          <p:cNvGrpSpPr/>
           <p:nvPr/>
-        </p:nvSpPr>
-        <p:spPr>
+        </p:nvGrpSpPr>
+        <p:grpSpPr>
           <a:xfrm>
-            <a:off x="1010093" y="2402958"/>
-            <a:ext cx="6698512" cy="4029740"/>
+            <a:off x="584176" y="2405578"/>
+            <a:ext cx="6152955" cy="1973918"/>
+            <a:chOff x="584176" y="2405578"/>
+            <a:chExt cx="6152955" cy="1973918"/>
           </a:xfrm>
-          <a:prstGeom prst="rect">
-            <a:avLst/>
-          </a:prstGeom>
-        </p:spPr>
-        <p:style>
-          <a:lnRef idx="2">
-            <a:schemeClr val="accent2"/>
-          </a:lnRef>
-          <a:fillRef idx="1">
-            <a:schemeClr val="lt1"/>
-          </a:fillRef>
-          <a:effectRef idx="0">
-            <a:schemeClr val="accent2"/>
-          </a:effectRef>
-          <a:fontRef idx="minor">
-            <a:schemeClr val="dk1"/>
-          </a:fontRef>
-        </p:style>
-        <p:txBody>
-          <a:bodyPr rtlCol="0" anchor="ctr"/>
-          <a:lstStyle/>
-          <a:p>
-            <a:pPr algn="ctr"/>
-            <a:endParaRPr lang="en-US"/>
-          </a:p>
-        </p:txBody>
-      </p:sp>
-      <p:sp>
-        <p:nvSpPr>
-          <p:cNvPr id="5" name="Rectangle 4"/>
-          <p:cNvSpPr/>
-          <p:nvPr/>
-        </p:nvSpPr>
-        <p:spPr>
-          <a:xfrm>
-            <a:off x="1010093" y="1690688"/>
-            <a:ext cx="6677247" cy="563414"/>
-          </a:xfrm>
-          <a:prstGeom prst="rect">
-            <a:avLst/>
-          </a:prstGeom>
-        </p:spPr>
-        <p:style>
-          <a:lnRef idx="2">
-            <a:schemeClr val="dk1"/>
-          </a:lnRef>
-          <a:fillRef idx="1">
-            <a:schemeClr val="lt1"/>
-          </a:fillRef>
-          <a:effectRef idx="0">
-            <a:schemeClr val="dk1"/>
-          </a:effectRef>
-          <a:fontRef idx="minor">
-            <a:schemeClr val="dk1"/>
-          </a:fontRef>
-        </p:style>
-        <p:txBody>
-          <a:bodyPr rtlCol="0" anchor="ctr"/>
-          <a:lstStyle/>
-          <a:p>
-            <a:r>
-              <a:rPr lang="en-US" dirty="0" smtClean="0"/>
-              <a:t>Please Input User ID:</a:t>
-            </a:r>
-            <a:endParaRPr lang="en-US" dirty="0"/>
-          </a:p>
-        </p:txBody>
-      </p:sp>
-      <p:sp>
-        <p:nvSpPr>
-          <p:cNvPr id="7" name="Rectangle 6"/>
-          <p:cNvSpPr/>
-          <p:nvPr/>
-        </p:nvSpPr>
-        <p:spPr>
-          <a:xfrm>
-            <a:off x="7081284" y="1690688"/>
-            <a:ext cx="606056" cy="563414"/>
-          </a:xfrm>
-          <a:prstGeom prst="rect">
-            <a:avLst/>
-          </a:prstGeom>
-        </p:spPr>
-        <p:style>
-          <a:lnRef idx="2">
-            <a:schemeClr val="dk1">
-              <a:shade val="50000"/>
-            </a:schemeClr>
-          </a:lnRef>
-          <a:fillRef idx="1">
-            <a:schemeClr val="dk1"/>
-          </a:fillRef>
-          <a:effectRef idx="0">
-            <a:schemeClr val="dk1"/>
-          </a:effectRef>
-          <a:fontRef idx="minor">
-            <a:schemeClr val="lt1"/>
-          </a:fontRef>
-        </p:style>
-        <p:txBody>
-          <a:bodyPr rtlCol="0" anchor="ctr"/>
-          <a:lstStyle/>
-          <a:p>
-            <a:pPr algn="ctr"/>
-            <a:endParaRPr lang="en-US"/>
-          </a:p>
-        </p:txBody>
-      </p:sp>
-      <p:sp>
-        <p:nvSpPr>
-          <p:cNvPr id="8" name="Triangle 7"/>
-          <p:cNvSpPr/>
-          <p:nvPr/>
-        </p:nvSpPr>
-        <p:spPr>
-          <a:xfrm rot="10800000">
-            <a:off x="7133596" y="1756261"/>
-            <a:ext cx="501432" cy="432269"/>
-          </a:xfrm>
-          <a:prstGeom prst="triangle">
-            <a:avLst/>
-          </a:prstGeom>
-        </p:spPr>
-        <p:style>
-          <a:lnRef idx="2">
-            <a:schemeClr val="dk1"/>
-          </a:lnRef>
-          <a:fillRef idx="1">
-            <a:schemeClr val="lt1"/>
-          </a:fillRef>
-          <a:effectRef idx="0">
-            <a:schemeClr val="dk1"/>
-          </a:effectRef>
-          <a:fontRef idx="minor">
-            <a:schemeClr val="dk1"/>
-          </a:fontRef>
-        </p:style>
-        <p:txBody>
-          <a:bodyPr rtlCol="0" anchor="ctr"/>
-          <a:lstStyle/>
-          <a:p>
-            <a:pPr algn="ctr"/>
-            <a:endParaRPr lang="en-US"/>
-          </a:p>
-        </p:txBody>
-      </p:sp>
-      <p:pic>
-        <p:nvPicPr>
-          <p:cNvPr id="9" name="Picture 8"/>
-          <p:cNvPicPr>
-            <a:picLocks noChangeAspect="1"/>
-          </p:cNvPicPr>
-          <p:nvPr/>
-        </p:nvPicPr>
-        <p:blipFill>
-          <a:blip r:embed="rId2"/>
-          <a:stretch>
-            <a:fillRect/>
-          </a:stretch>
-        </p:blipFill>
-        <p:spPr>
-          <a:xfrm>
-            <a:off x="2714290" y="2727251"/>
-            <a:ext cx="3717498" cy="3381153"/>
-          </a:xfrm>
-          <a:prstGeom prst="rect">
-            <a:avLst/>
-          </a:prstGeom>
-        </p:spPr>
-      </p:pic>
-      <p:sp>
-        <p:nvSpPr>
-          <p:cNvPr id="14" name="TextBox 13"/>
-          <p:cNvSpPr txBox="1"/>
-          <p:nvPr/>
-        </p:nvSpPr>
-        <p:spPr>
-          <a:xfrm>
-            <a:off x="8134062" y="1510730"/>
-            <a:ext cx="3272050" cy="923330"/>
-          </a:xfrm>
-          <a:prstGeom prst="rect">
-            <a:avLst/>
-          </a:prstGeom>
-          <a:noFill/>
-        </p:spPr>
-        <p:txBody>
-          <a:bodyPr wrap="none" rtlCol="0">
-            <a:spAutoFit/>
-          </a:bodyPr>
-          <a:lstStyle/>
-          <a:p>
-            <a:r>
-              <a:rPr lang="zh-CN" altLang="en-US" b="1" dirty="0" smtClean="0">
+        </p:grpSpPr>
+        <p:sp>
+          <p:nvSpPr>
+            <p:cNvPr id="4" name="Can 3"/>
+            <p:cNvSpPr/>
+            <p:nvPr/>
+          </p:nvSpPr>
+          <p:spPr>
+            <a:xfrm>
+              <a:off x="584176" y="3034935"/>
+              <a:ext cx="925264" cy="580913"/>
+            </a:xfrm>
+            <a:prstGeom prst="can">
+              <a:avLst/>
+            </a:prstGeom>
+            <a:effectLst>
+              <a:outerShdw blurRad="50800" dist="38100" dir="8100000" algn="tr" rotWithShape="0">
+                <a:prstClr val="black">
+                  <a:alpha val="40000"/>
+                </a:prstClr>
+              </a:outerShdw>
+            </a:effectLst>
+          </p:spPr>
+          <p:style>
+            <a:lnRef idx="2">
+              <a:schemeClr val="dk1"/>
+            </a:lnRef>
+            <a:fillRef idx="1">
+              <a:schemeClr val="lt1"/>
+            </a:fillRef>
+            <a:effectRef idx="0">
+              <a:schemeClr val="dk1"/>
+            </a:effectRef>
+            <a:fontRef idx="minor">
+              <a:schemeClr val="dk1"/>
+            </a:fontRef>
+          </p:style>
+          <p:txBody>
+            <a:bodyPr rtlCol="0" anchor="ctr"/>
+            <a:lstStyle/>
+            <a:p>
+              <a:pPr algn="ctr"/>
+              <a:r>
+                <a:rPr lang="en-US" sz="1000" dirty="0">
+                  <a:latin typeface="Courier New" charset="0"/>
+                  <a:ea typeface="Courier New" charset="0"/>
+                  <a:cs typeface="Courier New" charset="0"/>
+                </a:rPr>
+                <a:t>User</a:t>
+              </a:r>
+            </a:p>
+            <a:p>
+              <a:pPr algn="ctr"/>
+              <a:r>
+                <a:rPr lang="en-US" sz="1000" dirty="0">
+                  <a:latin typeface="Courier New" charset="0"/>
+                  <a:ea typeface="Courier New" charset="0"/>
+                  <a:cs typeface="Courier New" charset="0"/>
+                </a:rPr>
+                <a:t>Database</a:t>
+              </a:r>
+            </a:p>
+          </p:txBody>
+        </p:sp>
+        <p:sp>
+          <p:nvSpPr>
+            <p:cNvPr id="5" name="Rounded Rectangle 4"/>
+            <p:cNvSpPr/>
+            <p:nvPr/>
+          </p:nvSpPr>
+          <p:spPr>
+            <a:xfrm>
+              <a:off x="2126171" y="3118307"/>
+              <a:ext cx="1718880" cy="414168"/>
+            </a:xfrm>
+            <a:prstGeom prst="roundRect">
+              <a:avLst/>
+            </a:prstGeom>
+            <a:solidFill>
+              <a:schemeClr val="bg1">
+                <a:lumMod val="95000"/>
+              </a:schemeClr>
+            </a:solidFill>
+            <a:ln w="12700">
+              <a:solidFill>
+                <a:schemeClr val="tx1"/>
+              </a:solidFill>
+            </a:ln>
+            <a:effectLst>
+              <a:outerShdw blurRad="50800" dist="38100" dir="10800000" algn="r" rotWithShape="0">
+                <a:prstClr val="black">
+                  <a:alpha val="40000"/>
+                </a:prstClr>
+              </a:outerShdw>
+            </a:effectLst>
+          </p:spPr>
+          <p:style>
+            <a:lnRef idx="3">
+              <a:schemeClr val="lt1"/>
+            </a:lnRef>
+            <a:fillRef idx="1">
+              <a:schemeClr val="accent3"/>
+            </a:fillRef>
+            <a:effectRef idx="1">
+              <a:schemeClr val="accent3"/>
+            </a:effectRef>
+            <a:fontRef idx="minor">
+              <a:schemeClr val="lt1"/>
+            </a:fontRef>
+          </p:style>
+          <p:txBody>
+            <a:bodyPr rtlCol="0" anchor="ctr"/>
+            <a:lstStyle/>
+            <a:p>
+              <a:pPr algn="ctr"/>
+              <a:r>
+                <a:rPr lang="en-US" sz="1000" dirty="0" smtClean="0">
+                  <a:solidFill>
+                    <a:schemeClr val="tx1"/>
+                  </a:solidFill>
+                  <a:latin typeface="Courier New" charset="0"/>
+                  <a:ea typeface="Courier New" charset="0"/>
+                  <a:cs typeface="Courier New" charset="0"/>
+                </a:rPr>
+                <a:t>User Statistics Extraction</a:t>
+              </a:r>
+              <a:endParaRPr lang="en-US" sz="1000" dirty="0">
                 <a:solidFill>
-                  <a:srgbClr val="7030A0"/>
+                  <a:schemeClr val="tx1"/>
                 </a:solidFill>
-              </a:rPr>
-              <a:t>输入</a:t>
-            </a:r>
-            <a:r>
-              <a:rPr lang="en-US" altLang="zh-CN" b="1" dirty="0" smtClean="0">
+                <a:latin typeface="Courier New" charset="0"/>
+                <a:ea typeface="Courier New" charset="0"/>
+                <a:cs typeface="Courier New" charset="0"/>
+              </a:endParaRPr>
+            </a:p>
+          </p:txBody>
+        </p:sp>
+        <p:sp>
+          <p:nvSpPr>
+            <p:cNvPr id="6" name="Rounded Rectangle 5"/>
+            <p:cNvSpPr/>
+            <p:nvPr/>
+          </p:nvSpPr>
+          <p:spPr>
+            <a:xfrm>
+              <a:off x="4461781" y="3118307"/>
+              <a:ext cx="1718880" cy="414168"/>
+            </a:xfrm>
+            <a:prstGeom prst="roundRect">
+              <a:avLst/>
+            </a:prstGeom>
+            <a:solidFill>
+              <a:schemeClr val="bg1">
+                <a:lumMod val="95000"/>
+              </a:schemeClr>
+            </a:solidFill>
+            <a:ln w="12700">
+              <a:solidFill>
+                <a:schemeClr val="tx1"/>
+              </a:solidFill>
+            </a:ln>
+            <a:effectLst>
+              <a:outerShdw blurRad="50800" dist="38100" dir="10800000" algn="r" rotWithShape="0">
+                <a:prstClr val="black">
+                  <a:alpha val="40000"/>
+                </a:prstClr>
+              </a:outerShdw>
+            </a:effectLst>
+          </p:spPr>
+          <p:style>
+            <a:lnRef idx="3">
+              <a:schemeClr val="lt1"/>
+            </a:lnRef>
+            <a:fillRef idx="1">
+              <a:schemeClr val="accent3"/>
+            </a:fillRef>
+            <a:effectRef idx="1">
+              <a:schemeClr val="accent3"/>
+            </a:effectRef>
+            <a:fontRef idx="minor">
+              <a:schemeClr val="lt1"/>
+            </a:fontRef>
+          </p:style>
+          <p:txBody>
+            <a:bodyPr rtlCol="0" anchor="ctr"/>
+            <a:lstStyle/>
+            <a:p>
+              <a:pPr algn="ctr"/>
+              <a:r>
+                <a:rPr lang="en-US" sz="1000" dirty="0" smtClean="0">
+                  <a:solidFill>
+                    <a:schemeClr val="tx1"/>
+                  </a:solidFill>
+                  <a:latin typeface="Courier New" charset="0"/>
+                  <a:ea typeface="Courier New" charset="0"/>
+                  <a:cs typeface="Courier New" charset="0"/>
+                </a:rPr>
+                <a:t>Abnormal Recommendation</a:t>
+              </a:r>
+              <a:endParaRPr lang="en-US" sz="1000" dirty="0">
                 <a:solidFill>
-                  <a:srgbClr val="7030A0"/>
+                  <a:schemeClr val="tx1"/>
                 </a:solidFill>
-              </a:rPr>
-              <a:t>ID</a:t>
-            </a:r>
-            <a:r>
-              <a:rPr lang="zh-CN" altLang="en-US" b="1" dirty="0" smtClean="0">
+                <a:latin typeface="Courier New" charset="0"/>
+                <a:ea typeface="Courier New" charset="0"/>
+                <a:cs typeface="Courier New" charset="0"/>
+              </a:endParaRPr>
+            </a:p>
+          </p:txBody>
+        </p:sp>
+        <p:sp>
+          <p:nvSpPr>
+            <p:cNvPr id="8" name="Rectangle 7"/>
+            <p:cNvSpPr/>
+            <p:nvPr/>
+          </p:nvSpPr>
+          <p:spPr>
+            <a:xfrm>
+              <a:off x="1821759" y="3770864"/>
+              <a:ext cx="734133" cy="268474"/>
+            </a:xfrm>
+            <a:prstGeom prst="rect">
+              <a:avLst/>
+            </a:prstGeom>
+            <a:noFill/>
+            <a:ln w="12700">
+              <a:solidFill>
+                <a:schemeClr val="tx1"/>
+              </a:solidFill>
+            </a:ln>
+            <a:effectLst/>
+          </p:spPr>
+          <p:style>
+            <a:lnRef idx="3">
+              <a:schemeClr val="lt1"/>
+            </a:lnRef>
+            <a:fillRef idx="1">
+              <a:schemeClr val="accent3"/>
+            </a:fillRef>
+            <a:effectRef idx="1">
+              <a:schemeClr val="accent3"/>
+            </a:effectRef>
+            <a:fontRef idx="minor">
+              <a:schemeClr val="lt1"/>
+            </a:fontRef>
+          </p:style>
+          <p:txBody>
+            <a:bodyPr rtlCol="0" anchor="ctr"/>
+            <a:lstStyle/>
+            <a:p>
+              <a:pPr algn="ctr"/>
+              <a:r>
+                <a:rPr lang="en-US" sz="800" dirty="0">
+                  <a:solidFill>
+                    <a:schemeClr val="tx1"/>
+                  </a:solidFill>
+                  <a:latin typeface="Courier New" charset="0"/>
+                  <a:ea typeface="Courier New" charset="0"/>
+                  <a:cs typeface="Courier New" charset="0"/>
+                </a:rPr>
+                <a:t>Total </a:t>
+              </a:r>
+              <a:r>
+                <a:rPr lang="en-US" sz="800" dirty="0" smtClean="0">
+                  <a:solidFill>
+                    <a:schemeClr val="tx1"/>
+                  </a:solidFill>
+                  <a:latin typeface="Courier New" charset="0"/>
+                  <a:ea typeface="Courier New" charset="0"/>
+                  <a:cs typeface="Courier New" charset="0"/>
+                </a:rPr>
+                <a:t>Nodes</a:t>
+              </a:r>
+              <a:endParaRPr lang="en-US" sz="800" dirty="0">
                 <a:solidFill>
-                  <a:srgbClr val="7030A0"/>
+                  <a:schemeClr val="tx1"/>
                 </a:solidFill>
-              </a:rPr>
-              <a:t>方框</a:t>
-            </a:r>
-            <a:endParaRPr lang="en-US" altLang="zh-CN" b="1" dirty="0" smtClean="0">
+                <a:latin typeface="Courier New" charset="0"/>
+                <a:ea typeface="Courier New" charset="0"/>
+                <a:cs typeface="Courier New" charset="0"/>
+              </a:endParaRPr>
+            </a:p>
+          </p:txBody>
+        </p:sp>
+        <p:sp>
+          <p:nvSpPr>
+            <p:cNvPr id="9" name="Rectangle 8"/>
+            <p:cNvSpPr/>
+            <p:nvPr/>
+          </p:nvSpPr>
+          <p:spPr>
+            <a:xfrm>
+              <a:off x="2618545" y="3770864"/>
+              <a:ext cx="734133" cy="268474"/>
+            </a:xfrm>
+            <a:prstGeom prst="rect">
+              <a:avLst/>
+            </a:prstGeom>
+            <a:noFill/>
+            <a:ln w="12700">
               <a:solidFill>
-                <a:srgbClr val="7030A0"/>
+                <a:schemeClr val="tx1"/>
               </a:solidFill>
-            </a:endParaRPr>
-          </a:p>
-          <a:p>
-            <a:pPr marL="342900" indent="-342900">
-              <a:buAutoNum type="arabicPeriod"/>
-            </a:pPr>
-            <a:r>
-              <a:rPr lang="zh-CN" altLang="en-US" b="1" dirty="0" smtClean="0">
+            </a:ln>
+            <a:effectLst/>
+          </p:spPr>
+          <p:style>
+            <a:lnRef idx="3">
+              <a:schemeClr val="lt1"/>
+            </a:lnRef>
+            <a:fillRef idx="1">
+              <a:schemeClr val="accent3"/>
+            </a:fillRef>
+            <a:effectRef idx="1">
+              <a:schemeClr val="accent3"/>
+            </a:effectRef>
+            <a:fontRef idx="minor">
+              <a:schemeClr val="lt1"/>
+            </a:fontRef>
+          </p:style>
+          <p:txBody>
+            <a:bodyPr rtlCol="0" anchor="ctr"/>
+            <a:lstStyle/>
+            <a:p>
+              <a:pPr algn="ctr"/>
+              <a:r>
+                <a:rPr lang="en-US" sz="800" dirty="0" smtClean="0">
+                  <a:solidFill>
+                    <a:schemeClr val="tx1"/>
+                  </a:solidFill>
+                  <a:latin typeface="Courier New" charset="0"/>
+                  <a:ea typeface="Courier New" charset="0"/>
+                  <a:cs typeface="Courier New" charset="0"/>
+                </a:rPr>
+                <a:t>Time Groups</a:t>
+              </a:r>
+              <a:endParaRPr lang="en-US" sz="800" dirty="0">
                 <a:solidFill>
-                  <a:srgbClr val="7030A0"/>
+                  <a:schemeClr val="tx1"/>
                 </a:solidFill>
-              </a:rPr>
-              <a:t>可以直接输入</a:t>
-            </a:r>
-            <a:r>
-              <a:rPr lang="en-US" altLang="zh-CN" b="1" dirty="0" smtClean="0">
+                <a:latin typeface="Courier New" charset="0"/>
+                <a:ea typeface="Courier New" charset="0"/>
+                <a:cs typeface="Courier New" charset="0"/>
+              </a:endParaRPr>
+            </a:p>
+          </p:txBody>
+        </p:sp>
+        <p:sp>
+          <p:nvSpPr>
+            <p:cNvPr id="10" name="Rectangle 9"/>
+            <p:cNvSpPr/>
+            <p:nvPr/>
+          </p:nvSpPr>
+          <p:spPr>
+            <a:xfrm>
+              <a:off x="3415331" y="3770864"/>
+              <a:ext cx="734133" cy="268474"/>
+            </a:xfrm>
+            <a:prstGeom prst="rect">
+              <a:avLst/>
+            </a:prstGeom>
+            <a:noFill/>
+            <a:ln w="12700">
+              <a:solidFill>
+                <a:schemeClr val="tx1"/>
+              </a:solidFill>
+            </a:ln>
+            <a:effectLst/>
+          </p:spPr>
+          <p:style>
+            <a:lnRef idx="3">
+              <a:schemeClr val="lt1"/>
+            </a:lnRef>
+            <a:fillRef idx="1">
+              <a:schemeClr val="accent3"/>
+            </a:fillRef>
+            <a:effectRef idx="1">
+              <a:schemeClr val="accent3"/>
+            </a:effectRef>
+            <a:fontRef idx="minor">
+              <a:schemeClr val="lt1"/>
+            </a:fontRef>
+          </p:style>
+          <p:txBody>
+            <a:bodyPr rtlCol="0" anchor="ctr"/>
+            <a:lstStyle/>
+            <a:p>
+              <a:pPr algn="ctr"/>
+              <a:r>
+                <a:rPr lang="en-US" sz="800" smtClean="0">
+                  <a:solidFill>
+                    <a:schemeClr val="tx1"/>
+                  </a:solidFill>
+                  <a:latin typeface="Courier New" charset="0"/>
+                  <a:ea typeface="Courier New" charset="0"/>
+                  <a:cs typeface="Courier New" charset="0"/>
+                </a:rPr>
+                <a:t>Time Intervals</a:t>
+              </a:r>
+              <a:endParaRPr lang="en-US" sz="800" dirty="0">
                 <a:solidFill>
-                  <a:srgbClr val="7030A0"/>
+                  <a:schemeClr val="tx1"/>
                 </a:solidFill>
-              </a:rPr>
-              <a:t>User</a:t>
-            </a:r>
-            <a:r>
-              <a:rPr lang="zh-CN" altLang="en-US" b="1" dirty="0" smtClean="0">
+                <a:latin typeface="Courier New" charset="0"/>
+                <a:ea typeface="Courier New" charset="0"/>
+                <a:cs typeface="Courier New" charset="0"/>
+              </a:endParaRPr>
+            </a:p>
+          </p:txBody>
+        </p:sp>
+        <p:cxnSp>
+          <p:nvCxnSpPr>
+            <p:cNvPr id="12" name="Straight Arrow Connector 11"/>
+            <p:cNvCxnSpPr>
+              <a:stCxn id="5" idx="2"/>
+              <a:endCxn id="8" idx="0"/>
+            </p:cNvCxnSpPr>
+            <p:nvPr/>
+          </p:nvCxnSpPr>
+          <p:spPr>
+            <a:xfrm flipH="1">
+              <a:off x="2188826" y="3532475"/>
+              <a:ext cx="796785" cy="238389"/>
+            </a:xfrm>
+            <a:prstGeom prst="straightConnector1">
+              <a:avLst/>
+            </a:prstGeom>
+            <a:ln w="12700">
+              <a:solidFill>
+                <a:schemeClr val="tx1"/>
+              </a:solidFill>
+              <a:tailEnd type="triangle"/>
+            </a:ln>
+          </p:spPr>
+          <p:style>
+            <a:lnRef idx="1">
+              <a:schemeClr val="accent1"/>
+            </a:lnRef>
+            <a:fillRef idx="0">
+              <a:schemeClr val="accent1"/>
+            </a:fillRef>
+            <a:effectRef idx="0">
+              <a:schemeClr val="accent1"/>
+            </a:effectRef>
+            <a:fontRef idx="minor">
+              <a:schemeClr val="tx1"/>
+            </a:fontRef>
+          </p:style>
+        </p:cxnSp>
+        <p:cxnSp>
+          <p:nvCxnSpPr>
+            <p:cNvPr id="13" name="Straight Arrow Connector 12"/>
+            <p:cNvCxnSpPr>
+              <a:stCxn id="5" idx="2"/>
+              <a:endCxn id="9" idx="0"/>
+            </p:cNvCxnSpPr>
+            <p:nvPr/>
+          </p:nvCxnSpPr>
+          <p:spPr>
+            <a:xfrm>
+              <a:off x="2985611" y="3532475"/>
+              <a:ext cx="1" cy="238389"/>
+            </a:xfrm>
+            <a:prstGeom prst="straightConnector1">
+              <a:avLst/>
+            </a:prstGeom>
+            <a:ln w="12700">
+              <a:solidFill>
+                <a:schemeClr val="tx1"/>
+              </a:solidFill>
+              <a:tailEnd type="triangle"/>
+            </a:ln>
+          </p:spPr>
+          <p:style>
+            <a:lnRef idx="1">
+              <a:schemeClr val="accent1"/>
+            </a:lnRef>
+            <a:fillRef idx="0">
+              <a:schemeClr val="accent1"/>
+            </a:fillRef>
+            <a:effectRef idx="0">
+              <a:schemeClr val="accent1"/>
+            </a:effectRef>
+            <a:fontRef idx="minor">
+              <a:schemeClr val="tx1"/>
+            </a:fontRef>
+          </p:style>
+        </p:cxnSp>
+        <p:cxnSp>
+          <p:nvCxnSpPr>
+            <p:cNvPr id="16" name="Straight Arrow Connector 15"/>
+            <p:cNvCxnSpPr>
+              <a:stCxn id="5" idx="2"/>
+              <a:endCxn id="10" idx="0"/>
+            </p:cNvCxnSpPr>
+            <p:nvPr/>
+          </p:nvCxnSpPr>
+          <p:spPr>
+            <a:xfrm>
+              <a:off x="2985611" y="3532475"/>
+              <a:ext cx="796787" cy="238389"/>
+            </a:xfrm>
+            <a:prstGeom prst="straightConnector1">
+              <a:avLst/>
+            </a:prstGeom>
+            <a:ln w="12700">
+              <a:solidFill>
+                <a:schemeClr val="tx1"/>
+              </a:solidFill>
+              <a:tailEnd type="triangle"/>
+            </a:ln>
+          </p:spPr>
+          <p:style>
+            <a:lnRef idx="1">
+              <a:schemeClr val="accent1"/>
+            </a:lnRef>
+            <a:fillRef idx="0">
+              <a:schemeClr val="accent1"/>
+            </a:fillRef>
+            <a:effectRef idx="0">
+              <a:schemeClr val="accent1"/>
+            </a:effectRef>
+            <a:fontRef idx="minor">
+              <a:schemeClr val="tx1"/>
+            </a:fontRef>
+          </p:style>
+        </p:cxnSp>
+        <p:sp>
+          <p:nvSpPr>
+            <p:cNvPr id="19" name="Right Arrow 18"/>
+            <p:cNvSpPr/>
+            <p:nvPr/>
+          </p:nvSpPr>
+          <p:spPr>
+            <a:xfrm>
+              <a:off x="1654895" y="3249566"/>
+              <a:ext cx="325821" cy="151650"/>
+            </a:xfrm>
+            <a:prstGeom prst="rightArrow">
+              <a:avLst>
+                <a:gd name="adj1" fmla="val 50000"/>
+                <a:gd name="adj2" fmla="val 111468"/>
+              </a:avLst>
+            </a:prstGeom>
+          </p:spPr>
+          <p:style>
+            <a:lnRef idx="2">
+              <a:schemeClr val="dk1"/>
+            </a:lnRef>
+            <a:fillRef idx="1">
+              <a:schemeClr val="lt1"/>
+            </a:fillRef>
+            <a:effectRef idx="0">
+              <a:schemeClr val="dk1"/>
+            </a:effectRef>
+            <a:fontRef idx="minor">
+              <a:schemeClr val="dk1"/>
+            </a:fontRef>
+          </p:style>
+          <p:txBody>
+            <a:bodyPr rtlCol="0" anchor="ctr"/>
+            <a:lstStyle/>
+            <a:p>
+              <a:pPr algn="ctr"/>
+              <a:endParaRPr lang="en-US"/>
+            </a:p>
+          </p:txBody>
+        </p:sp>
+        <p:sp>
+          <p:nvSpPr>
+            <p:cNvPr id="23" name="Right Arrow 22"/>
+            <p:cNvSpPr/>
+            <p:nvPr/>
+          </p:nvSpPr>
+          <p:spPr>
+            <a:xfrm>
+              <a:off x="3990505" y="3249566"/>
+              <a:ext cx="325821" cy="151650"/>
+            </a:xfrm>
+            <a:prstGeom prst="rightArrow">
+              <a:avLst>
+                <a:gd name="adj1" fmla="val 50000"/>
+                <a:gd name="adj2" fmla="val 111468"/>
+              </a:avLst>
+            </a:prstGeom>
+          </p:spPr>
+          <p:style>
+            <a:lnRef idx="2">
+              <a:schemeClr val="dk1"/>
+            </a:lnRef>
+            <a:fillRef idx="1">
+              <a:schemeClr val="lt1"/>
+            </a:fillRef>
+            <a:effectRef idx="0">
+              <a:schemeClr val="dk1"/>
+            </a:effectRef>
+            <a:fontRef idx="minor">
+              <a:schemeClr val="dk1"/>
+            </a:fontRef>
+          </p:style>
+          <p:txBody>
+            <a:bodyPr rtlCol="0" anchor="ctr"/>
+            <a:lstStyle/>
+            <a:p>
+              <a:pPr algn="ctr"/>
+              <a:endParaRPr lang="en-US"/>
+            </a:p>
+          </p:txBody>
+        </p:sp>
+        <p:sp>
+          <p:nvSpPr>
+            <p:cNvPr id="25" name="Rectangle 24"/>
+            <p:cNvSpPr/>
+            <p:nvPr/>
+          </p:nvSpPr>
+          <p:spPr>
+            <a:xfrm>
+              <a:off x="4461781" y="3754934"/>
+              <a:ext cx="734133" cy="268474"/>
+            </a:xfrm>
+            <a:prstGeom prst="rect">
+              <a:avLst/>
+            </a:prstGeom>
+            <a:noFill/>
+            <a:ln w="12700">
+              <a:solidFill>
+                <a:schemeClr val="tx1"/>
+              </a:solidFill>
+            </a:ln>
+            <a:effectLst/>
+          </p:spPr>
+          <p:style>
+            <a:lnRef idx="3">
+              <a:schemeClr val="lt1"/>
+            </a:lnRef>
+            <a:fillRef idx="1">
+              <a:schemeClr val="accent3"/>
+            </a:fillRef>
+            <a:effectRef idx="1">
+              <a:schemeClr val="accent3"/>
+            </a:effectRef>
+            <a:fontRef idx="minor">
+              <a:schemeClr val="lt1"/>
+            </a:fontRef>
+          </p:style>
+          <p:txBody>
+            <a:bodyPr rtlCol="0" anchor="ctr"/>
+            <a:lstStyle/>
+            <a:p>
+              <a:pPr algn="ctr"/>
+              <a:r>
+                <a:rPr lang="en-US" sz="800" dirty="0" smtClean="0">
+                  <a:solidFill>
+                    <a:schemeClr val="tx1"/>
+                  </a:solidFill>
+                  <a:latin typeface="Courier New" charset="0"/>
+                  <a:ea typeface="Courier New" charset="0"/>
+                  <a:cs typeface="Courier New" charset="0"/>
+                </a:rPr>
+                <a:t>Score Groups</a:t>
+              </a:r>
+              <a:endParaRPr lang="en-US" sz="800" dirty="0">
                 <a:solidFill>
-                  <a:srgbClr val="7030A0"/>
+                  <a:schemeClr val="tx1"/>
                 </a:solidFill>
-              </a:rPr>
-              <a:t>  </a:t>
-            </a:r>
-            <a:r>
-              <a:rPr lang="en-US" altLang="zh-CN" b="1" dirty="0" smtClean="0">
+                <a:latin typeface="Courier New" charset="0"/>
+                <a:ea typeface="Courier New" charset="0"/>
+                <a:cs typeface="Courier New" charset="0"/>
+              </a:endParaRPr>
+            </a:p>
+          </p:txBody>
+        </p:sp>
+        <p:sp>
+          <p:nvSpPr>
+            <p:cNvPr id="26" name="Rectangle 25"/>
+            <p:cNvSpPr/>
+            <p:nvPr/>
+          </p:nvSpPr>
+          <p:spPr>
+            <a:xfrm>
+              <a:off x="5446527" y="3752875"/>
+              <a:ext cx="734133" cy="268474"/>
+            </a:xfrm>
+            <a:prstGeom prst="rect">
+              <a:avLst/>
+            </a:prstGeom>
+            <a:noFill/>
+            <a:ln w="12700">
+              <a:solidFill>
+                <a:schemeClr val="tx1"/>
+              </a:solidFill>
+            </a:ln>
+            <a:effectLst/>
+          </p:spPr>
+          <p:style>
+            <a:lnRef idx="3">
+              <a:schemeClr val="lt1"/>
+            </a:lnRef>
+            <a:fillRef idx="1">
+              <a:schemeClr val="accent3"/>
+            </a:fillRef>
+            <a:effectRef idx="1">
+              <a:schemeClr val="accent3"/>
+            </a:effectRef>
+            <a:fontRef idx="minor">
+              <a:schemeClr val="lt1"/>
+            </a:fontRef>
+          </p:style>
+          <p:txBody>
+            <a:bodyPr rtlCol="0" anchor="ctr"/>
+            <a:lstStyle/>
+            <a:p>
+              <a:pPr algn="ctr"/>
+              <a:r>
+                <a:rPr lang="en-US" sz="800" smtClean="0">
+                  <a:solidFill>
+                    <a:schemeClr val="tx1"/>
+                  </a:solidFill>
+                  <a:latin typeface="Courier New" charset="0"/>
+                  <a:ea typeface="Courier New" charset="0"/>
+                  <a:cs typeface="Courier New" charset="0"/>
+                </a:rPr>
+                <a:t>Analysis Results</a:t>
+              </a:r>
+              <a:endParaRPr lang="en-US" sz="800" dirty="0">
                 <a:solidFill>
-                  <a:srgbClr val="7030A0"/>
+                  <a:schemeClr val="tx1"/>
                 </a:solidFill>
-              </a:rPr>
-              <a:t>ID</a:t>
-            </a:r>
-            <a:r>
-              <a:rPr lang="zh-CN" altLang="en-US" b="1" dirty="0" smtClean="0">
+                <a:latin typeface="Courier New" charset="0"/>
+                <a:ea typeface="Courier New" charset="0"/>
+                <a:cs typeface="Courier New" charset="0"/>
+              </a:endParaRPr>
+            </a:p>
+          </p:txBody>
+        </p:sp>
+        <p:sp>
+          <p:nvSpPr>
+            <p:cNvPr id="36" name="Rounded Rectangle 35"/>
+            <p:cNvSpPr/>
+            <p:nvPr/>
+          </p:nvSpPr>
+          <p:spPr>
+            <a:xfrm>
+              <a:off x="2118310" y="2405578"/>
+              <a:ext cx="2710537" cy="414168"/>
+            </a:xfrm>
+            <a:prstGeom prst="roundRect">
+              <a:avLst/>
+            </a:prstGeom>
+            <a:solidFill>
+              <a:schemeClr val="bg1">
+                <a:lumMod val="95000"/>
+              </a:schemeClr>
+            </a:solidFill>
+            <a:ln w="12700">
+              <a:solidFill>
+                <a:schemeClr val="tx1"/>
+              </a:solidFill>
+            </a:ln>
+            <a:effectLst>
+              <a:outerShdw blurRad="50800" dist="38100" dir="10800000" algn="r" rotWithShape="0">
+                <a:prstClr val="black">
+                  <a:alpha val="40000"/>
+                </a:prstClr>
+              </a:outerShdw>
+            </a:effectLst>
+          </p:spPr>
+          <p:style>
+            <a:lnRef idx="3">
+              <a:schemeClr val="lt1"/>
+            </a:lnRef>
+            <a:fillRef idx="1">
+              <a:schemeClr val="accent3"/>
+            </a:fillRef>
+            <a:effectRef idx="1">
+              <a:schemeClr val="accent3"/>
+            </a:effectRef>
+            <a:fontRef idx="minor">
+              <a:schemeClr val="lt1"/>
+            </a:fontRef>
+          </p:style>
+          <p:txBody>
+            <a:bodyPr rtlCol="0" anchor="ctr"/>
+            <a:lstStyle/>
+            <a:p>
+              <a:pPr algn="ctr"/>
+              <a:r>
+                <a:rPr lang="en-US" sz="1000" dirty="0" smtClean="0">
+                  <a:solidFill>
+                    <a:schemeClr val="tx1"/>
+                  </a:solidFill>
+                  <a:latin typeface="Courier New" charset="0"/>
+                  <a:ea typeface="Courier New" charset="0"/>
+                  <a:cs typeface="Courier New" charset="0"/>
+                </a:rPr>
+                <a:t>Multilayer Network Visualization</a:t>
+              </a:r>
+              <a:endParaRPr lang="en-US" sz="1000" dirty="0">
                 <a:solidFill>
-                  <a:srgbClr val="7030A0"/>
+                  <a:schemeClr val="tx1"/>
                 </a:solidFill>
-              </a:rPr>
-              <a:t> </a:t>
-            </a:r>
-            <a:endParaRPr lang="en-US" altLang="zh-CN" b="1" dirty="0" smtClean="0">
+                <a:latin typeface="Courier New" charset="0"/>
+                <a:ea typeface="Courier New" charset="0"/>
+                <a:cs typeface="Courier New" charset="0"/>
+              </a:endParaRPr>
+            </a:p>
+          </p:txBody>
+        </p:sp>
+        <p:cxnSp>
+          <p:nvCxnSpPr>
+            <p:cNvPr id="47" name="Straight Arrow Connector 46"/>
+            <p:cNvCxnSpPr>
+              <a:stCxn id="6" idx="2"/>
+              <a:endCxn id="25" idx="0"/>
+            </p:cNvCxnSpPr>
+            <p:nvPr/>
+          </p:nvCxnSpPr>
+          <p:spPr>
+            <a:xfrm flipH="1">
+              <a:off x="4828848" y="3532475"/>
+              <a:ext cx="492373" cy="222459"/>
+            </a:xfrm>
+            <a:prstGeom prst="straightConnector1">
+              <a:avLst/>
+            </a:prstGeom>
+            <a:ln w="12700">
               <a:solidFill>
-                <a:srgbClr val="7030A0"/>
+                <a:schemeClr val="tx1"/>
               </a:solidFill>
-            </a:endParaRPr>
-          </a:p>
-          <a:p>
-            <a:pPr marL="342900" indent="-342900">
-              <a:buAutoNum type="arabicPeriod"/>
-            </a:pPr>
-            <a:r>
-              <a:rPr lang="zh-CN" altLang="en-US" b="1" dirty="0" smtClean="0">
+              <a:tailEnd type="triangle"/>
+            </a:ln>
+          </p:spPr>
+          <p:style>
+            <a:lnRef idx="1">
+              <a:schemeClr val="accent1"/>
+            </a:lnRef>
+            <a:fillRef idx="0">
+              <a:schemeClr val="accent1"/>
+            </a:fillRef>
+            <a:effectRef idx="0">
+              <a:schemeClr val="accent1"/>
+            </a:effectRef>
+            <a:fontRef idx="minor">
+              <a:schemeClr val="tx1"/>
+            </a:fontRef>
+          </p:style>
+        </p:cxnSp>
+        <p:cxnSp>
+          <p:nvCxnSpPr>
+            <p:cNvPr id="50" name="Straight Arrow Connector 49"/>
+            <p:cNvCxnSpPr>
+              <a:stCxn id="6" idx="2"/>
+              <a:endCxn id="26" idx="0"/>
+            </p:cNvCxnSpPr>
+            <p:nvPr/>
+          </p:nvCxnSpPr>
+          <p:spPr>
+            <a:xfrm>
+              <a:off x="5321221" y="3532475"/>
+              <a:ext cx="492373" cy="220400"/>
+            </a:xfrm>
+            <a:prstGeom prst="straightConnector1">
+              <a:avLst/>
+            </a:prstGeom>
+            <a:ln w="12700">
+              <a:solidFill>
+                <a:schemeClr val="tx1"/>
+              </a:solidFill>
+              <a:tailEnd type="triangle"/>
+            </a:ln>
+          </p:spPr>
+          <p:style>
+            <a:lnRef idx="1">
+              <a:schemeClr val="accent1"/>
+            </a:lnRef>
+            <a:fillRef idx="0">
+              <a:schemeClr val="accent1"/>
+            </a:fillRef>
+            <a:effectRef idx="0">
+              <a:schemeClr val="accent1"/>
+            </a:effectRef>
+            <a:fontRef idx="minor">
+              <a:schemeClr val="tx1"/>
+            </a:fontRef>
+          </p:style>
+        </p:cxnSp>
+        <p:sp>
+          <p:nvSpPr>
+            <p:cNvPr id="57" name="Rectangle 56"/>
+            <p:cNvSpPr/>
+            <p:nvPr/>
+          </p:nvSpPr>
+          <p:spPr>
+            <a:xfrm>
+              <a:off x="5446527" y="4040942"/>
+              <a:ext cx="1290604" cy="338554"/>
+            </a:xfrm>
+            <a:prstGeom prst="rect">
+              <a:avLst/>
+            </a:prstGeom>
+          </p:spPr>
+          <p:txBody>
+            <a:bodyPr wrap="square">
+              <a:spAutoFit/>
+            </a:bodyPr>
+            <a:lstStyle/>
+            <a:p>
+              <a:pPr marL="228600" indent="-228600">
+                <a:buFont typeface="+mj-lt"/>
+                <a:buAutoNum type="arabicPeriod"/>
+              </a:pPr>
+              <a:r>
+                <a:rPr lang="en-US" sz="800" u="sng" dirty="0">
+                  <a:latin typeface="Courier New" charset="0"/>
+                  <a:ea typeface="Courier New" charset="0"/>
+                  <a:cs typeface="Courier New" charset="0"/>
+                </a:rPr>
+                <a:t>Security Score</a:t>
+              </a:r>
+            </a:p>
+            <a:p>
+              <a:pPr marL="228600" indent="-228600">
+                <a:buFont typeface="+mj-lt"/>
+                <a:buAutoNum type="arabicPeriod"/>
+              </a:pPr>
+              <a:r>
+                <a:rPr lang="en-US" sz="800" u="sng" dirty="0">
+                  <a:latin typeface="Courier New" charset="0"/>
+                  <a:ea typeface="Courier New" charset="0"/>
+                  <a:cs typeface="Courier New" charset="0"/>
+                </a:rPr>
+                <a:t>Reasoning</a:t>
+              </a:r>
+              <a:endParaRPr lang="en-US" sz="800" u="sng" dirty="0"/>
+            </a:p>
+          </p:txBody>
+        </p:sp>
+        <p:cxnSp>
+          <p:nvCxnSpPr>
+            <p:cNvPr id="60" name="Elbow Connector 59"/>
+            <p:cNvCxnSpPr>
+              <a:stCxn id="6" idx="0"/>
+              <a:endCxn id="36" idx="3"/>
+            </p:cNvCxnSpPr>
+            <p:nvPr/>
+          </p:nvCxnSpPr>
+          <p:spPr>
+            <a:xfrm rot="16200000" flipV="1">
+              <a:off x="4822212" y="2619298"/>
+              <a:ext cx="505645" cy="492374"/>
+            </a:xfrm>
+            <a:prstGeom prst="bentConnector2">
+              <a:avLst/>
+            </a:prstGeom>
+            <a:ln w="12700">
+              <a:solidFill>
+                <a:schemeClr val="tx1"/>
+              </a:solidFill>
+              <a:tailEnd type="triangle"/>
+            </a:ln>
+          </p:spPr>
+          <p:style>
+            <a:lnRef idx="1">
+              <a:schemeClr val="accent1"/>
+            </a:lnRef>
+            <a:fillRef idx="0">
+              <a:schemeClr val="accent1"/>
+            </a:fillRef>
+            <a:effectRef idx="0">
+              <a:schemeClr val="accent1"/>
+            </a:effectRef>
+            <a:fontRef idx="minor">
+              <a:schemeClr val="tx1"/>
+            </a:fontRef>
+          </p:style>
+        </p:cxnSp>
+        <p:sp>
+          <p:nvSpPr>
+            <p:cNvPr id="61" name="Rectangle 60"/>
+            <p:cNvSpPr/>
+            <p:nvPr/>
+          </p:nvSpPr>
+          <p:spPr>
+            <a:xfrm>
+              <a:off x="5321221" y="2660963"/>
+              <a:ext cx="1415910" cy="338554"/>
+            </a:xfrm>
+            <a:prstGeom prst="rect">
+              <a:avLst/>
+            </a:prstGeom>
+          </p:spPr>
+          <p:txBody>
+            <a:bodyPr wrap="square">
+              <a:spAutoFit/>
+            </a:bodyPr>
+            <a:lstStyle/>
+            <a:p>
+              <a:r>
+                <a:rPr lang="en-US" sz="800" dirty="0" smtClean="0">
+                  <a:latin typeface="Courier New" charset="0"/>
+                  <a:ea typeface="Courier New" charset="0"/>
+                  <a:cs typeface="Courier New" charset="0"/>
+                </a:rPr>
+                <a:t>If has abnormal:</a:t>
+              </a:r>
+            </a:p>
+            <a:p>
+              <a:pPr marL="228600" indent="-228600">
+                <a:buFont typeface="Arial" charset="0"/>
+                <a:buChar char="•"/>
+              </a:pPr>
+              <a:r>
+                <a:rPr lang="en-US" sz="800" u="sng" dirty="0" smtClean="0">
+                  <a:latin typeface="Courier New" charset="0"/>
+                  <a:ea typeface="Courier New" charset="0"/>
+                  <a:cs typeface="Courier New" charset="0"/>
+                </a:rPr>
+                <a:t>Mark Abnormal</a:t>
+              </a:r>
+              <a:endParaRPr lang="en-US" sz="800" u="sng" dirty="0"/>
+            </a:p>
+          </p:txBody>
+        </p:sp>
+        <p:sp>
+          <p:nvSpPr>
+            <p:cNvPr id="63" name="Down Arrow 62"/>
+            <p:cNvSpPr/>
+            <p:nvPr/>
+          </p:nvSpPr>
+          <p:spPr>
+            <a:xfrm rot="10800000">
+              <a:off x="2896609" y="2879918"/>
+              <a:ext cx="178003" cy="173503"/>
+            </a:xfrm>
+            <a:prstGeom prst="downArrow">
+              <a:avLst>
+                <a:gd name="adj1" fmla="val 50000"/>
+                <a:gd name="adj2" fmla="val 60979"/>
+              </a:avLst>
+            </a:prstGeom>
+          </p:spPr>
+          <p:style>
+            <a:lnRef idx="2">
+              <a:schemeClr val="dk1"/>
+            </a:lnRef>
+            <a:fillRef idx="1">
+              <a:schemeClr val="lt1"/>
+            </a:fillRef>
+            <a:effectRef idx="0">
+              <a:schemeClr val="dk1"/>
+            </a:effectRef>
+            <a:fontRef idx="minor">
+              <a:schemeClr val="dk1"/>
+            </a:fontRef>
+          </p:style>
+          <p:txBody>
+            <a:bodyPr rtlCol="0" anchor="ctr"/>
+            <a:lstStyle/>
+            <a:p>
+              <a:pPr algn="ctr"/>
+              <a:endParaRPr lang="en-US">
                 <a:solidFill>
-                  <a:srgbClr val="7030A0"/>
+                  <a:schemeClr val="dk1"/>
                 </a:solidFill>
-              </a:rPr>
-              <a:t>可以通过下拉菜单选择</a:t>
-            </a:r>
-            <a:r>
-              <a:rPr lang="en-US" altLang="zh-CN" b="1" dirty="0" smtClean="0">
-                <a:solidFill>
-                  <a:srgbClr val="7030A0"/>
-                </a:solidFill>
-              </a:rPr>
-              <a:t>User</a:t>
-            </a:r>
-            <a:endParaRPr lang="en-US" b="1" dirty="0">
-              <a:solidFill>
-                <a:srgbClr val="7030A0"/>
-              </a:solidFill>
-            </a:endParaRPr>
-          </a:p>
-        </p:txBody>
-      </p:sp>
-      <p:sp>
-        <p:nvSpPr>
-          <p:cNvPr id="15" name="TextBox 14"/>
-          <p:cNvSpPr txBox="1"/>
-          <p:nvPr/>
-        </p:nvSpPr>
-        <p:spPr>
-          <a:xfrm>
-            <a:off x="8133907" y="2600880"/>
-            <a:ext cx="3838353" cy="3831818"/>
-          </a:xfrm>
-          <a:prstGeom prst="rect">
-            <a:avLst/>
-          </a:prstGeom>
-          <a:noFill/>
-        </p:spPr>
-        <p:txBody>
-          <a:bodyPr wrap="square" rtlCol="0">
-            <a:spAutoFit/>
-          </a:bodyPr>
-          <a:lstStyle/>
-          <a:p>
-            <a:pPr>
-              <a:lnSpc>
-                <a:spcPct val="150000"/>
-              </a:lnSpc>
-            </a:pPr>
-            <a:r>
-              <a:rPr lang="zh-CN" altLang="en-US" b="1" dirty="0" smtClean="0">
-                <a:solidFill>
-                  <a:srgbClr val="7030A0"/>
-                </a:solidFill>
-              </a:rPr>
-              <a:t>所有节点的</a:t>
-            </a:r>
-            <a:r>
-              <a:rPr lang="en-US" altLang="zh-CN" b="1" dirty="0" smtClean="0">
-                <a:solidFill>
-                  <a:srgbClr val="7030A0"/>
-                </a:solidFill>
-              </a:rPr>
-              <a:t>Network</a:t>
-            </a:r>
-            <a:r>
-              <a:rPr lang="zh-CN" altLang="en-US" b="1" dirty="0" smtClean="0">
-                <a:solidFill>
-                  <a:srgbClr val="7030A0"/>
-                </a:solidFill>
-              </a:rPr>
-              <a:t>网络图</a:t>
-            </a:r>
-            <a:endParaRPr lang="en-US" altLang="zh-CN" b="1" dirty="0" smtClean="0">
-              <a:solidFill>
-                <a:srgbClr val="7030A0"/>
-              </a:solidFill>
-            </a:endParaRPr>
-          </a:p>
-          <a:p>
-            <a:pPr marL="342900" indent="-342900">
-              <a:lnSpc>
-                <a:spcPct val="150000"/>
-              </a:lnSpc>
-              <a:buAutoNum type="arabicPeriod"/>
-            </a:pPr>
-            <a:r>
-              <a:rPr lang="zh-CN" altLang="en-US" b="1" dirty="0" smtClean="0">
-                <a:solidFill>
-                  <a:srgbClr val="7030A0"/>
-                </a:solidFill>
-              </a:rPr>
-              <a:t>每一种颜色代表一个</a:t>
-            </a:r>
-            <a:r>
-              <a:rPr lang="en-US" altLang="zh-CN" b="1" dirty="0" smtClean="0">
-                <a:solidFill>
-                  <a:srgbClr val="7030A0"/>
-                </a:solidFill>
-              </a:rPr>
-              <a:t>User</a:t>
-            </a:r>
-          </a:p>
-          <a:p>
-            <a:pPr marL="342900" indent="-342900">
-              <a:lnSpc>
-                <a:spcPct val="150000"/>
-              </a:lnSpc>
-              <a:buAutoNum type="arabicPeriod"/>
-            </a:pPr>
-            <a:r>
-              <a:rPr lang="zh-CN" altLang="en-US" b="1" dirty="0" smtClean="0">
-                <a:solidFill>
-                  <a:srgbClr val="7030A0"/>
-                </a:solidFill>
-              </a:rPr>
-              <a:t>这个图应该是随机布局的。目的是为了展示“混乱”程度。</a:t>
-            </a:r>
-            <a:endParaRPr lang="en-US" altLang="zh-CN" b="1" dirty="0" smtClean="0">
-              <a:solidFill>
-                <a:srgbClr val="7030A0"/>
-              </a:solidFill>
-            </a:endParaRPr>
-          </a:p>
-          <a:p>
-            <a:pPr marL="342900" indent="-342900">
-              <a:lnSpc>
-                <a:spcPct val="150000"/>
-              </a:lnSpc>
-              <a:buAutoNum type="arabicPeriod"/>
-            </a:pPr>
-            <a:r>
-              <a:rPr lang="zh-CN" altLang="en-US" b="1" dirty="0" smtClean="0">
-                <a:solidFill>
-                  <a:srgbClr val="7030A0"/>
-                </a:solidFill>
-              </a:rPr>
-              <a:t>图上的点是可以点击的。点击效果和上面输入</a:t>
-            </a:r>
-            <a:r>
-              <a:rPr lang="en-US" altLang="zh-CN" b="1" dirty="0" smtClean="0">
-                <a:solidFill>
-                  <a:srgbClr val="7030A0"/>
-                </a:solidFill>
-              </a:rPr>
-              <a:t>Id</a:t>
-            </a:r>
-            <a:r>
-              <a:rPr lang="zh-CN" altLang="en-US" b="1" dirty="0" smtClean="0">
-                <a:solidFill>
-                  <a:srgbClr val="7030A0"/>
-                </a:solidFill>
-              </a:rPr>
-              <a:t>方框的效果是一样的。</a:t>
-            </a:r>
-            <a:endParaRPr lang="en-US" altLang="zh-CN" b="1" dirty="0" smtClean="0">
-              <a:solidFill>
-                <a:srgbClr val="7030A0"/>
-              </a:solidFill>
-            </a:endParaRPr>
-          </a:p>
-          <a:p>
-            <a:pPr marL="342900" indent="-342900">
-              <a:lnSpc>
-                <a:spcPct val="150000"/>
-              </a:lnSpc>
-              <a:buAutoNum type="arabicPeriod"/>
-            </a:pPr>
-            <a:r>
-              <a:rPr lang="en-US" altLang="zh-CN" b="1" dirty="0" smtClean="0">
-                <a:solidFill>
-                  <a:srgbClr val="7030A0"/>
-                </a:solidFill>
-              </a:rPr>
-              <a:t>p.s.</a:t>
-            </a:r>
-            <a:r>
-              <a:rPr lang="zh-CN" altLang="en-US" b="1" dirty="0" smtClean="0">
-                <a:solidFill>
-                  <a:srgbClr val="7030A0"/>
-                </a:solidFill>
-              </a:rPr>
-              <a:t>如果节点太多，就随机展示</a:t>
-            </a:r>
-            <a:r>
-              <a:rPr lang="en-US" altLang="zh-CN" b="1" dirty="0" smtClean="0">
-                <a:solidFill>
-                  <a:srgbClr val="7030A0"/>
-                </a:solidFill>
-              </a:rPr>
-              <a:t>100</a:t>
-            </a:r>
-            <a:r>
-              <a:rPr lang="zh-CN" altLang="en-US" b="1" dirty="0" smtClean="0">
-                <a:solidFill>
-                  <a:srgbClr val="7030A0"/>
-                </a:solidFill>
-              </a:rPr>
-              <a:t>个左右就</a:t>
-            </a:r>
-            <a:r>
-              <a:rPr lang="en-US" altLang="zh-CN" b="1" dirty="0" smtClean="0">
-                <a:solidFill>
-                  <a:srgbClr val="7030A0"/>
-                </a:solidFill>
-              </a:rPr>
-              <a:t>OK</a:t>
-            </a:r>
-            <a:r>
-              <a:rPr lang="zh-CN" altLang="en-US" b="1" dirty="0" smtClean="0">
-                <a:solidFill>
-                  <a:srgbClr val="7030A0"/>
-                </a:solidFill>
-              </a:rPr>
-              <a:t>了</a:t>
-            </a:r>
-            <a:endParaRPr lang="en-US" b="1" dirty="0">
-              <a:solidFill>
-                <a:srgbClr val="7030A0"/>
-              </a:solidFill>
-            </a:endParaRPr>
-          </a:p>
-        </p:txBody>
-      </p:sp>
+              </a:endParaRPr>
+            </a:p>
+          </p:txBody>
+        </p:sp>
+      </p:grpSp>
     </p:spTree>
     <p:extLst>
       <p:ext uri="{BB962C8B-B14F-4D97-AF65-F5344CB8AC3E}">
-        <p14:creationId xmlns:p14="http://schemas.microsoft.com/office/powerpoint/2010/main" val="1303274987"/>
+        <p14:creationId xmlns:p14="http://schemas.microsoft.com/office/powerpoint/2010/main" val="332650367"/>
       </p:ext>
     </p:extLst>
   </p:cSld>

</xml_diff>